<commit_message>
feature(travel): Travel page complete and fully functional
</commit_message>
<xml_diff>
--- a/docs/mockup.pptx
+++ b/docs/mockup.pptx
@@ -280,7 +280,7 @@
           <a:p>
             <a:fld id="{867712E5-25A9-42F2-8C6E-E4003B5A397C}" type="datetimeFigureOut">
               <a:rPr lang="en-GB" smtClean="0"/>
-              <a:t>23/05/2021</a:t>
+              <a:t>04/06/2021</a:t>
             </a:fld>
             <a:endParaRPr lang="en-GB"/>
           </a:p>
@@ -480,7 +480,7 @@
           <a:p>
             <a:fld id="{867712E5-25A9-42F2-8C6E-E4003B5A397C}" type="datetimeFigureOut">
               <a:rPr lang="en-GB" smtClean="0"/>
-              <a:t>23/05/2021</a:t>
+              <a:t>04/06/2021</a:t>
             </a:fld>
             <a:endParaRPr lang="en-GB"/>
           </a:p>
@@ -690,7 +690,7 @@
           <a:p>
             <a:fld id="{867712E5-25A9-42F2-8C6E-E4003B5A397C}" type="datetimeFigureOut">
               <a:rPr lang="en-GB" smtClean="0"/>
-              <a:t>23/05/2021</a:t>
+              <a:t>04/06/2021</a:t>
             </a:fld>
             <a:endParaRPr lang="en-GB"/>
           </a:p>
@@ -890,7 +890,7 @@
           <a:p>
             <a:fld id="{867712E5-25A9-42F2-8C6E-E4003B5A397C}" type="datetimeFigureOut">
               <a:rPr lang="en-GB" smtClean="0"/>
-              <a:t>23/05/2021</a:t>
+              <a:t>04/06/2021</a:t>
             </a:fld>
             <a:endParaRPr lang="en-GB"/>
           </a:p>
@@ -1166,7 +1166,7 @@
           <a:p>
             <a:fld id="{867712E5-25A9-42F2-8C6E-E4003B5A397C}" type="datetimeFigureOut">
               <a:rPr lang="en-GB" smtClean="0"/>
-              <a:t>23/05/2021</a:t>
+              <a:t>04/06/2021</a:t>
             </a:fld>
             <a:endParaRPr lang="en-GB"/>
           </a:p>
@@ -1434,7 +1434,7 @@
           <a:p>
             <a:fld id="{867712E5-25A9-42F2-8C6E-E4003B5A397C}" type="datetimeFigureOut">
               <a:rPr lang="en-GB" smtClean="0"/>
-              <a:t>23/05/2021</a:t>
+              <a:t>04/06/2021</a:t>
             </a:fld>
             <a:endParaRPr lang="en-GB"/>
           </a:p>
@@ -1849,7 +1849,7 @@
           <a:p>
             <a:fld id="{867712E5-25A9-42F2-8C6E-E4003B5A397C}" type="datetimeFigureOut">
               <a:rPr lang="en-GB" smtClean="0"/>
-              <a:t>23/05/2021</a:t>
+              <a:t>04/06/2021</a:t>
             </a:fld>
             <a:endParaRPr lang="en-GB"/>
           </a:p>
@@ -1991,7 +1991,7 @@
           <a:p>
             <a:fld id="{867712E5-25A9-42F2-8C6E-E4003B5A397C}" type="datetimeFigureOut">
               <a:rPr lang="en-GB" smtClean="0"/>
-              <a:t>23/05/2021</a:t>
+              <a:t>04/06/2021</a:t>
             </a:fld>
             <a:endParaRPr lang="en-GB"/>
           </a:p>
@@ -2104,7 +2104,7 @@
           <a:p>
             <a:fld id="{867712E5-25A9-42F2-8C6E-E4003B5A397C}" type="datetimeFigureOut">
               <a:rPr lang="en-GB" smtClean="0"/>
-              <a:t>23/05/2021</a:t>
+              <a:t>04/06/2021</a:t>
             </a:fld>
             <a:endParaRPr lang="en-GB"/>
           </a:p>
@@ -2417,7 +2417,7 @@
           <a:p>
             <a:fld id="{867712E5-25A9-42F2-8C6E-E4003B5A397C}" type="datetimeFigureOut">
               <a:rPr lang="en-GB" smtClean="0"/>
-              <a:t>23/05/2021</a:t>
+              <a:t>04/06/2021</a:t>
             </a:fld>
             <a:endParaRPr lang="en-GB"/>
           </a:p>
@@ -2706,7 +2706,7 @@
           <a:p>
             <a:fld id="{867712E5-25A9-42F2-8C6E-E4003B5A397C}" type="datetimeFigureOut">
               <a:rPr lang="en-GB" smtClean="0"/>
-              <a:t>23/05/2021</a:t>
+              <a:t>04/06/2021</a:t>
             </a:fld>
             <a:endParaRPr lang="en-GB"/>
           </a:p>
@@ -2949,7 +2949,7 @@
           <a:p>
             <a:fld id="{867712E5-25A9-42F2-8C6E-E4003B5A397C}" type="datetimeFigureOut">
               <a:rPr lang="en-GB" smtClean="0"/>
-              <a:t>23/05/2021</a:t>
+              <a:t>04/06/2021</a:t>
             </a:fld>
             <a:endParaRPr lang="en-GB"/>
           </a:p>
@@ -16037,6 +16037,201 @@
           </a:p>
         </p:txBody>
       </p:sp>
+      <p:pic>
+        <p:nvPicPr>
+          <p:cNvPr id="4" name="Graphic 3" descr="Toy Train with solid fill">
+            <a:extLst>
+              <a:ext uri="{FF2B5EF4-FFF2-40B4-BE49-F238E27FC236}">
+                <a16:creationId xmlns:a16="http://schemas.microsoft.com/office/drawing/2014/main" id="{9BCC9930-5C45-4FF2-90BC-429E72018799}"/>
+              </a:ext>
+            </a:extLst>
+          </p:cNvPr>
+          <p:cNvPicPr>
+            <a:picLocks noChangeAspect="1"/>
+          </p:cNvPicPr>
+          <p:nvPr/>
+        </p:nvPicPr>
+        <p:blipFill>
+          <a:blip r:embed="rId20">
+            <a:extLst>
+              <a:ext uri="{28A0092B-C50C-407E-A947-70E740481C1C}">
+                <a14:useLocalDpi xmlns:a14="http://schemas.microsoft.com/office/drawing/2010/main" val="0"/>
+              </a:ext>
+              <a:ext uri="{96DAC541-7B7A-43D3-8B79-37D633B846F1}">
+                <asvg:svgBlip xmlns:asvg="http://schemas.microsoft.com/office/drawing/2016/SVG/main" r:embed="rId21"/>
+              </a:ext>
+            </a:extLst>
+          </a:blip>
+          <a:stretch>
+            <a:fillRect/>
+          </a:stretch>
+        </p:blipFill>
+        <p:spPr>
+          <a:xfrm>
+            <a:off x="10339200" y="3814910"/>
+            <a:ext cx="914400" cy="914400"/>
+          </a:xfrm>
+          <a:prstGeom prst="rect">
+            <a:avLst/>
+          </a:prstGeom>
+        </p:spPr>
+      </p:pic>
+      <p:pic>
+        <p:nvPicPr>
+          <p:cNvPr id="9" name="Graphic 8" descr="Sail Boat (Like Pirate) with solid fill">
+            <a:extLst>
+              <a:ext uri="{FF2B5EF4-FFF2-40B4-BE49-F238E27FC236}">
+                <a16:creationId xmlns:a16="http://schemas.microsoft.com/office/drawing/2014/main" id="{69B6C510-654E-4E14-8EDC-43C0DE88B58D}"/>
+              </a:ext>
+            </a:extLst>
+          </p:cNvPr>
+          <p:cNvPicPr>
+            <a:picLocks noChangeAspect="1"/>
+          </p:cNvPicPr>
+          <p:nvPr/>
+        </p:nvPicPr>
+        <p:blipFill>
+          <a:blip r:embed="rId22">
+            <a:extLst>
+              <a:ext uri="{28A0092B-C50C-407E-A947-70E740481C1C}">
+                <a14:useLocalDpi xmlns:a14="http://schemas.microsoft.com/office/drawing/2010/main" val="0"/>
+              </a:ext>
+              <a:ext uri="{96DAC541-7B7A-43D3-8B79-37D633B846F1}">
+                <asvg:svgBlip xmlns:asvg="http://schemas.microsoft.com/office/drawing/2016/SVG/main" r:embed="rId23"/>
+              </a:ext>
+            </a:extLst>
+          </a:blip>
+          <a:stretch>
+            <a:fillRect/>
+          </a:stretch>
+        </p:blipFill>
+        <p:spPr>
+          <a:xfrm>
+            <a:off x="10472958" y="4839757"/>
+            <a:ext cx="914400" cy="914400"/>
+          </a:xfrm>
+          <a:prstGeom prst="rect">
+            <a:avLst/>
+          </a:prstGeom>
+        </p:spPr>
+      </p:pic>
+      <p:pic>
+        <p:nvPicPr>
+          <p:cNvPr id="13" name="Graphic 12" descr="Hot air balloon with solid fill">
+            <a:extLst>
+              <a:ext uri="{FF2B5EF4-FFF2-40B4-BE49-F238E27FC236}">
+                <a16:creationId xmlns:a16="http://schemas.microsoft.com/office/drawing/2014/main" id="{778CB80D-2B94-471B-8482-54595E3B2ECC}"/>
+              </a:ext>
+            </a:extLst>
+          </p:cNvPr>
+          <p:cNvPicPr>
+            <a:picLocks noChangeAspect="1"/>
+          </p:cNvPicPr>
+          <p:nvPr/>
+        </p:nvPicPr>
+        <p:blipFill>
+          <a:blip r:embed="rId24">
+            <a:extLst>
+              <a:ext uri="{28A0092B-C50C-407E-A947-70E740481C1C}">
+                <a14:useLocalDpi xmlns:a14="http://schemas.microsoft.com/office/drawing/2010/main" val="0"/>
+              </a:ext>
+              <a:ext uri="{96DAC541-7B7A-43D3-8B79-37D633B846F1}">
+                <asvg:svgBlip xmlns:asvg="http://schemas.microsoft.com/office/drawing/2016/SVG/main" r:embed="rId25"/>
+              </a:ext>
+            </a:extLst>
+          </a:blip>
+          <a:stretch>
+            <a:fillRect/>
+          </a:stretch>
+        </p:blipFill>
+        <p:spPr>
+          <a:xfrm>
+            <a:off x="10339200" y="5754157"/>
+            <a:ext cx="914400" cy="914400"/>
+          </a:xfrm>
+          <a:prstGeom prst="rect">
+            <a:avLst/>
+          </a:prstGeom>
+        </p:spPr>
+      </p:pic>
+      <p:pic>
+        <p:nvPicPr>
+          <p:cNvPr id="83" name="Graphic 82" descr="Stamp outline">
+            <a:extLst>
+              <a:ext uri="{FF2B5EF4-FFF2-40B4-BE49-F238E27FC236}">
+                <a16:creationId xmlns:a16="http://schemas.microsoft.com/office/drawing/2014/main" id="{CCE9AFF5-0EC7-4B80-9072-8B8DCDB0FE95}"/>
+              </a:ext>
+            </a:extLst>
+          </p:cNvPr>
+          <p:cNvPicPr>
+            <a:picLocks noChangeAspect="1"/>
+          </p:cNvPicPr>
+          <p:nvPr/>
+        </p:nvPicPr>
+        <p:blipFill>
+          <a:blip r:embed="rId26">
+            <a:extLst>
+              <a:ext uri="{28A0092B-C50C-407E-A947-70E740481C1C}">
+                <a14:useLocalDpi xmlns:a14="http://schemas.microsoft.com/office/drawing/2010/main" val="0"/>
+              </a:ext>
+              <a:ext uri="{96DAC541-7B7A-43D3-8B79-37D633B846F1}">
+                <asvg:svgBlip xmlns:asvg="http://schemas.microsoft.com/office/drawing/2016/SVG/main" r:embed="rId27"/>
+              </a:ext>
+            </a:extLst>
+          </a:blip>
+          <a:stretch>
+            <a:fillRect/>
+          </a:stretch>
+        </p:blipFill>
+        <p:spPr>
+          <a:xfrm>
+            <a:off x="125150" y="6010990"/>
+            <a:ext cx="914400" cy="914400"/>
+          </a:xfrm>
+          <a:prstGeom prst="rect">
+            <a:avLst/>
+          </a:prstGeom>
+        </p:spPr>
+      </p:pic>
+      <p:pic>
+        <p:nvPicPr>
+          <p:cNvPr id="6" name="Graphic 5" descr="Stamp with solid fill">
+            <a:extLst>
+              <a:ext uri="{FF2B5EF4-FFF2-40B4-BE49-F238E27FC236}">
+                <a16:creationId xmlns:a16="http://schemas.microsoft.com/office/drawing/2014/main" id="{1D684842-5A1A-45C5-B4D1-F41DA74AD61E}"/>
+              </a:ext>
+            </a:extLst>
+          </p:cNvPr>
+          <p:cNvPicPr>
+            <a:picLocks noChangeAspect="1"/>
+          </p:cNvPicPr>
+          <p:nvPr/>
+        </p:nvPicPr>
+        <p:blipFill>
+          <a:blip r:embed="rId28">
+            <a:extLst>
+              <a:ext uri="{28A0092B-C50C-407E-A947-70E740481C1C}">
+                <a14:useLocalDpi xmlns:a14="http://schemas.microsoft.com/office/drawing/2010/main" val="0"/>
+              </a:ext>
+              <a:ext uri="{96DAC541-7B7A-43D3-8B79-37D633B846F1}">
+                <asvg:svgBlip xmlns:asvg="http://schemas.microsoft.com/office/drawing/2016/SVG/main" r:embed="rId29"/>
+              </a:ext>
+            </a:extLst>
+          </a:blip>
+          <a:stretch>
+            <a:fillRect/>
+          </a:stretch>
+        </p:blipFill>
+        <p:spPr>
+          <a:xfrm>
+            <a:off x="938400" y="6006114"/>
+            <a:ext cx="914400" cy="914400"/>
+          </a:xfrm>
+          <a:prstGeom prst="rect">
+            <a:avLst/>
+          </a:prstGeom>
+        </p:spPr>
+      </p:pic>
     </p:spTree>
     <p:extLst>
       <p:ext uri="{BB962C8B-B14F-4D97-AF65-F5344CB8AC3E}">

</xml_diff>

<commit_message>
feature(mockup): Updated mockup icons
</commit_message>
<xml_diff>
--- a/docs/mockup.pptx
+++ b/docs/mockup.pptx
@@ -17274,12 +17274,96 @@
           </a:p>
         </p:txBody>
       </p:sp>
+      <p:sp>
+        <p:nvSpPr>
+          <p:cNvPr id="47" name="Speech Bubble: Rectangle 46">
+            <a:extLst>
+              <a:ext uri="{FF2B5EF4-FFF2-40B4-BE49-F238E27FC236}">
+                <a16:creationId xmlns:a16="http://schemas.microsoft.com/office/drawing/2014/main" id="{2E5BAD01-A7E7-4654-9C25-E01A3F2393C4}"/>
+              </a:ext>
+            </a:extLst>
+          </p:cNvPr>
+          <p:cNvSpPr/>
+          <p:nvPr/>
+        </p:nvSpPr>
+        <p:spPr>
+          <a:xfrm>
+            <a:off x="4112697" y="4604846"/>
+            <a:ext cx="2464637" cy="512791"/>
+          </a:xfrm>
+          <a:prstGeom prst="wedgeRectCallout">
+            <a:avLst>
+              <a:gd name="adj1" fmla="val -123798"/>
+              <a:gd name="adj2" fmla="val -229864"/>
+            </a:avLst>
+          </a:prstGeom>
+        </p:spPr>
+        <p:style>
+          <a:lnRef idx="2">
+            <a:schemeClr val="dk1"/>
+          </a:lnRef>
+          <a:fillRef idx="1">
+            <a:schemeClr val="lt1"/>
+          </a:fillRef>
+          <a:effectRef idx="0">
+            <a:schemeClr val="dk1"/>
+          </a:effectRef>
+          <a:fontRef idx="minor">
+            <a:schemeClr val="dk1"/>
+          </a:fontRef>
+        </p:style>
+        <p:txBody>
+          <a:bodyPr rtlCol="0" anchor="ctr"/>
+          <a:lstStyle/>
+          <a:p>
+            <a:r>
+              <a:rPr lang="es-ES" sz="1800" dirty="0" err="1">
+                <a:effectLst/>
+                <a:latin typeface="Arial" panose="020B0604020202020204" pitchFamily="34" charset="0"/>
+              </a:rPr>
+              <a:t>Give</a:t>
+            </a:r>
+            <a:r>
+              <a:rPr lang="es-ES" sz="1800" dirty="0">
+                <a:effectLst/>
+                <a:latin typeface="Arial" panose="020B0604020202020204" pitchFamily="34" charset="0"/>
+              </a:rPr>
+              <a:t> a </a:t>
+            </a:r>
+            <a:r>
+              <a:rPr lang="es-ES" sz="1800" dirty="0" err="1">
+                <a:effectLst/>
+                <a:latin typeface="Arial" panose="020B0604020202020204" pitchFamily="34" charset="0"/>
+              </a:rPr>
+              <a:t>surprise</a:t>
+            </a:r>
+            <a:r>
+              <a:rPr lang="es-ES" sz="1800" dirty="0">
+                <a:effectLst/>
+                <a:latin typeface="Arial" panose="020B0604020202020204" pitchFamily="34" charset="0"/>
+              </a:rPr>
+              <a:t> </a:t>
+            </a:r>
+            <a:r>
+              <a:rPr lang="es-ES" sz="1800" dirty="0" err="1">
+                <a:effectLst/>
+                <a:latin typeface="Arial" panose="020B0604020202020204" pitchFamily="34" charset="0"/>
+              </a:rPr>
+              <a:t>card</a:t>
+            </a:r>
+            <a:endParaRPr lang="en-GB" sz="1800" dirty="0">
+              <a:effectLst/>
+              <a:latin typeface="Arial" panose="020B0604020202020204" pitchFamily="34" charset="0"/>
+            </a:endParaRPr>
+          </a:p>
+        </p:txBody>
+      </p:sp>
       <p:pic>
         <p:nvPicPr>
-          <p:cNvPr id="6" name="Graphic 5" descr="Scroll with solid fill">
-            <a:extLst>
-              <a:ext uri="{FF2B5EF4-FFF2-40B4-BE49-F238E27FC236}">
-                <a16:creationId xmlns:a16="http://schemas.microsoft.com/office/drawing/2014/main" id="{9A53C013-E922-479E-A19A-47C936B01BF7}"/>
+          <p:cNvPr id="9" name="Graphic 8" descr="Gauge with solid fill">
+            <a:extLst>
+              <a:ext uri="{FF2B5EF4-FFF2-40B4-BE49-F238E27FC236}">
+                <a16:creationId xmlns:a16="http://schemas.microsoft.com/office/drawing/2014/main" id="{22ADFE0C-05C1-46C7-882E-21DC2E4C80DE}"/>
               </a:ext>
             </a:extLst>
           </p:cNvPr>
@@ -17305,20 +17389,371 @@
         </p:blipFill>
         <p:spPr>
           <a:xfrm>
-            <a:off x="2089633" y="2176538"/>
-            <a:ext cx="339677" cy="339677"/>
+            <a:off x="1761973" y="2156621"/>
+            <a:ext cx="327660" cy="327660"/>
           </a:xfrm>
           <a:prstGeom prst="rect">
             <a:avLst/>
           </a:prstGeom>
         </p:spPr>
       </p:pic>
-      <p:sp>
-        <p:nvSpPr>
-          <p:cNvPr id="47" name="Speech Bubble: Rectangle 46">
-            <a:extLst>
-              <a:ext uri="{FF2B5EF4-FFF2-40B4-BE49-F238E27FC236}">
-                <a16:creationId xmlns:a16="http://schemas.microsoft.com/office/drawing/2014/main" id="{2E5BAD01-A7E7-4654-9C25-E01A3F2393C4}"/>
+      <p:pic>
+        <p:nvPicPr>
+          <p:cNvPr id="48" name="Graphic 47" descr="Refresh with solid fill">
+            <a:extLst>
+              <a:ext uri="{FF2B5EF4-FFF2-40B4-BE49-F238E27FC236}">
+                <a16:creationId xmlns:a16="http://schemas.microsoft.com/office/drawing/2014/main" id="{EA14456F-07B0-4E57-B373-BCAB8BC2A2C0}"/>
+              </a:ext>
+            </a:extLst>
+          </p:cNvPr>
+          <p:cNvPicPr>
+            <a:picLocks noChangeAspect="1"/>
+          </p:cNvPicPr>
+          <p:nvPr/>
+        </p:nvPicPr>
+        <p:blipFill>
+          <a:blip r:embed="rId12">
+            <a:extLst>
+              <a:ext uri="{28A0092B-C50C-407E-A947-70E740481C1C}">
+                <a14:useLocalDpi xmlns:a14="http://schemas.microsoft.com/office/drawing/2010/main" val="0"/>
+              </a:ext>
+              <a:ext uri="{96DAC541-7B7A-43D3-8B79-37D633B846F1}">
+                <asvg:svgBlip xmlns:asvg="http://schemas.microsoft.com/office/drawing/2016/SVG/main" r:embed="rId13"/>
+              </a:ext>
+            </a:extLst>
+          </a:blip>
+          <a:stretch>
+            <a:fillRect/>
+          </a:stretch>
+        </p:blipFill>
+        <p:spPr>
+          <a:xfrm>
+            <a:off x="2794217" y="2732926"/>
+            <a:ext cx="339485" cy="339485"/>
+          </a:xfrm>
+          <a:prstGeom prst="rect">
+            <a:avLst/>
+          </a:prstGeom>
+        </p:spPr>
+      </p:pic>
+      <p:pic>
+        <p:nvPicPr>
+          <p:cNvPr id="49" name="Graphic 48" descr="Treasure chest with solid fill">
+            <a:extLst>
+              <a:ext uri="{FF2B5EF4-FFF2-40B4-BE49-F238E27FC236}">
+                <a16:creationId xmlns:a16="http://schemas.microsoft.com/office/drawing/2014/main" id="{238BAF12-5E39-4C56-B155-6DAFBD9BADFD}"/>
+              </a:ext>
+            </a:extLst>
+          </p:cNvPr>
+          <p:cNvPicPr>
+            <a:picLocks noChangeAspect="1"/>
+          </p:cNvPicPr>
+          <p:nvPr/>
+        </p:nvPicPr>
+        <p:blipFill>
+          <a:blip r:embed="rId14">
+            <a:extLst>
+              <a:ext uri="{28A0092B-C50C-407E-A947-70E740481C1C}">
+                <a14:useLocalDpi xmlns:a14="http://schemas.microsoft.com/office/drawing/2010/main" val="0"/>
+              </a:ext>
+              <a:ext uri="{96DAC541-7B7A-43D3-8B79-37D633B846F1}">
+                <asvg:svgBlip xmlns:asvg="http://schemas.microsoft.com/office/drawing/2016/SVG/main" r:embed="rId15"/>
+              </a:ext>
+            </a:extLst>
+          </a:blip>
+          <a:stretch>
+            <a:fillRect/>
+          </a:stretch>
+        </p:blipFill>
+        <p:spPr>
+          <a:xfrm>
+            <a:off x="2437720" y="2732926"/>
+            <a:ext cx="361705" cy="361705"/>
+          </a:xfrm>
+          <a:prstGeom prst="rect">
+            <a:avLst/>
+          </a:prstGeom>
+        </p:spPr>
+      </p:pic>
+      <p:pic>
+        <p:nvPicPr>
+          <p:cNvPr id="51" name="Graphic 50" descr="Gauge with solid fill">
+            <a:extLst>
+              <a:ext uri="{FF2B5EF4-FFF2-40B4-BE49-F238E27FC236}">
+                <a16:creationId xmlns:a16="http://schemas.microsoft.com/office/drawing/2014/main" id="{415139BB-C896-455B-89E4-2D9F28C98026}"/>
+              </a:ext>
+            </a:extLst>
+          </p:cNvPr>
+          <p:cNvPicPr>
+            <a:picLocks noChangeAspect="1"/>
+          </p:cNvPicPr>
+          <p:nvPr/>
+        </p:nvPicPr>
+        <p:blipFill>
+          <a:blip r:embed="rId16">
+            <a:extLst>
+              <a:ext uri="{28A0092B-C50C-407E-A947-70E740481C1C}">
+                <a14:useLocalDpi xmlns:a14="http://schemas.microsoft.com/office/drawing/2010/main" val="0"/>
+              </a:ext>
+              <a:ext uri="{96DAC541-7B7A-43D3-8B79-37D633B846F1}">
+                <asvg:svgBlip xmlns:asvg="http://schemas.microsoft.com/office/drawing/2016/SVG/main" r:embed="rId17"/>
+              </a:ext>
+            </a:extLst>
+          </a:blip>
+          <a:stretch>
+            <a:fillRect/>
+          </a:stretch>
+        </p:blipFill>
+        <p:spPr>
+          <a:xfrm>
+            <a:off x="1761973" y="2719953"/>
+            <a:ext cx="327660" cy="327660"/>
+          </a:xfrm>
+          <a:prstGeom prst="rect">
+            <a:avLst/>
+          </a:prstGeom>
+        </p:spPr>
+      </p:pic>
+      <p:pic>
+        <p:nvPicPr>
+          <p:cNvPr id="72" name="Graphic 71" descr="Refresh with solid fill">
+            <a:extLst>
+              <a:ext uri="{FF2B5EF4-FFF2-40B4-BE49-F238E27FC236}">
+                <a16:creationId xmlns:a16="http://schemas.microsoft.com/office/drawing/2014/main" id="{8F501946-7D1D-44DA-A23A-D01251BE3AF0}"/>
+              </a:ext>
+            </a:extLst>
+          </p:cNvPr>
+          <p:cNvPicPr>
+            <a:picLocks noChangeAspect="1"/>
+          </p:cNvPicPr>
+          <p:nvPr/>
+        </p:nvPicPr>
+        <p:blipFill>
+          <a:blip r:embed="rId12">
+            <a:extLst>
+              <a:ext uri="{28A0092B-C50C-407E-A947-70E740481C1C}">
+                <a14:useLocalDpi xmlns:a14="http://schemas.microsoft.com/office/drawing/2010/main" val="0"/>
+              </a:ext>
+              <a:ext uri="{96DAC541-7B7A-43D3-8B79-37D633B846F1}">
+                <asvg:svgBlip xmlns:asvg="http://schemas.microsoft.com/office/drawing/2016/SVG/main" r:embed="rId13"/>
+              </a:ext>
+            </a:extLst>
+          </a:blip>
+          <a:stretch>
+            <a:fillRect/>
+          </a:stretch>
+        </p:blipFill>
+        <p:spPr>
+          <a:xfrm>
+            <a:off x="2772657" y="3343807"/>
+            <a:ext cx="339485" cy="339485"/>
+          </a:xfrm>
+          <a:prstGeom prst="rect">
+            <a:avLst/>
+          </a:prstGeom>
+        </p:spPr>
+      </p:pic>
+      <p:pic>
+        <p:nvPicPr>
+          <p:cNvPr id="73" name="Graphic 72" descr="Treasure chest with solid fill">
+            <a:extLst>
+              <a:ext uri="{FF2B5EF4-FFF2-40B4-BE49-F238E27FC236}">
+                <a16:creationId xmlns:a16="http://schemas.microsoft.com/office/drawing/2014/main" id="{2C0774EE-FA08-40A6-A5D1-3F16DD79AB24}"/>
+              </a:ext>
+            </a:extLst>
+          </p:cNvPr>
+          <p:cNvPicPr>
+            <a:picLocks noChangeAspect="1"/>
+          </p:cNvPicPr>
+          <p:nvPr/>
+        </p:nvPicPr>
+        <p:blipFill>
+          <a:blip r:embed="rId14">
+            <a:extLst>
+              <a:ext uri="{28A0092B-C50C-407E-A947-70E740481C1C}">
+                <a14:useLocalDpi xmlns:a14="http://schemas.microsoft.com/office/drawing/2010/main" val="0"/>
+              </a:ext>
+              <a:ext uri="{96DAC541-7B7A-43D3-8B79-37D633B846F1}">
+                <asvg:svgBlip xmlns:asvg="http://schemas.microsoft.com/office/drawing/2016/SVG/main" r:embed="rId15"/>
+              </a:ext>
+            </a:extLst>
+          </a:blip>
+          <a:stretch>
+            <a:fillRect/>
+          </a:stretch>
+        </p:blipFill>
+        <p:spPr>
+          <a:xfrm>
+            <a:off x="2416160" y="3343807"/>
+            <a:ext cx="361705" cy="361705"/>
+          </a:xfrm>
+          <a:prstGeom prst="rect">
+            <a:avLst/>
+          </a:prstGeom>
+        </p:spPr>
+      </p:pic>
+      <p:pic>
+        <p:nvPicPr>
+          <p:cNvPr id="75" name="Graphic 74" descr="Gauge with solid fill">
+            <a:extLst>
+              <a:ext uri="{FF2B5EF4-FFF2-40B4-BE49-F238E27FC236}">
+                <a16:creationId xmlns:a16="http://schemas.microsoft.com/office/drawing/2014/main" id="{EED2A392-243C-4827-860D-BDA0EEBE7BC4}"/>
+              </a:ext>
+            </a:extLst>
+          </p:cNvPr>
+          <p:cNvPicPr>
+            <a:picLocks noChangeAspect="1"/>
+          </p:cNvPicPr>
+          <p:nvPr/>
+        </p:nvPicPr>
+        <p:blipFill>
+          <a:blip r:embed="rId16">
+            <a:extLst>
+              <a:ext uri="{28A0092B-C50C-407E-A947-70E740481C1C}">
+                <a14:useLocalDpi xmlns:a14="http://schemas.microsoft.com/office/drawing/2010/main" val="0"/>
+              </a:ext>
+              <a:ext uri="{96DAC541-7B7A-43D3-8B79-37D633B846F1}">
+                <asvg:svgBlip xmlns:asvg="http://schemas.microsoft.com/office/drawing/2016/SVG/main" r:embed="rId17"/>
+              </a:ext>
+            </a:extLst>
+          </a:blip>
+          <a:stretch>
+            <a:fillRect/>
+          </a:stretch>
+        </p:blipFill>
+        <p:spPr>
+          <a:xfrm>
+            <a:off x="1740413" y="3330834"/>
+            <a:ext cx="327660" cy="327660"/>
+          </a:xfrm>
+          <a:prstGeom prst="rect">
+            <a:avLst/>
+          </a:prstGeom>
+        </p:spPr>
+      </p:pic>
+      <p:pic>
+        <p:nvPicPr>
+          <p:cNvPr id="76" name="Graphic 75" descr="Refresh with solid fill">
+            <a:extLst>
+              <a:ext uri="{FF2B5EF4-FFF2-40B4-BE49-F238E27FC236}">
+                <a16:creationId xmlns:a16="http://schemas.microsoft.com/office/drawing/2014/main" id="{8AED5C0F-B48E-4CBD-AD0B-E55681C47BC8}"/>
+              </a:ext>
+            </a:extLst>
+          </p:cNvPr>
+          <p:cNvPicPr>
+            <a:picLocks noChangeAspect="1"/>
+          </p:cNvPicPr>
+          <p:nvPr/>
+        </p:nvPicPr>
+        <p:blipFill>
+          <a:blip r:embed="rId12">
+            <a:extLst>
+              <a:ext uri="{28A0092B-C50C-407E-A947-70E740481C1C}">
+                <a14:useLocalDpi xmlns:a14="http://schemas.microsoft.com/office/drawing/2010/main" val="0"/>
+              </a:ext>
+              <a:ext uri="{96DAC541-7B7A-43D3-8B79-37D633B846F1}">
+                <asvg:svgBlip xmlns:asvg="http://schemas.microsoft.com/office/drawing/2016/SVG/main" r:embed="rId13"/>
+              </a:ext>
+            </a:extLst>
+          </a:blip>
+          <a:stretch>
+            <a:fillRect/>
+          </a:stretch>
+        </p:blipFill>
+        <p:spPr>
+          <a:xfrm>
+            <a:off x="2794217" y="3941634"/>
+            <a:ext cx="339485" cy="339485"/>
+          </a:xfrm>
+          <a:prstGeom prst="rect">
+            <a:avLst/>
+          </a:prstGeom>
+        </p:spPr>
+      </p:pic>
+      <p:pic>
+        <p:nvPicPr>
+          <p:cNvPr id="77" name="Graphic 76" descr="Treasure chest with solid fill">
+            <a:extLst>
+              <a:ext uri="{FF2B5EF4-FFF2-40B4-BE49-F238E27FC236}">
+                <a16:creationId xmlns:a16="http://schemas.microsoft.com/office/drawing/2014/main" id="{474A58A9-4E6E-4F5A-8547-7D626EEF0CDB}"/>
+              </a:ext>
+            </a:extLst>
+          </p:cNvPr>
+          <p:cNvPicPr>
+            <a:picLocks noChangeAspect="1"/>
+          </p:cNvPicPr>
+          <p:nvPr/>
+        </p:nvPicPr>
+        <p:blipFill>
+          <a:blip r:embed="rId14">
+            <a:extLst>
+              <a:ext uri="{28A0092B-C50C-407E-A947-70E740481C1C}">
+                <a14:useLocalDpi xmlns:a14="http://schemas.microsoft.com/office/drawing/2010/main" val="0"/>
+              </a:ext>
+              <a:ext uri="{96DAC541-7B7A-43D3-8B79-37D633B846F1}">
+                <asvg:svgBlip xmlns:asvg="http://schemas.microsoft.com/office/drawing/2016/SVG/main" r:embed="rId15"/>
+              </a:ext>
+            </a:extLst>
+          </a:blip>
+          <a:stretch>
+            <a:fillRect/>
+          </a:stretch>
+        </p:blipFill>
+        <p:spPr>
+          <a:xfrm>
+            <a:off x="2437720" y="3941634"/>
+            <a:ext cx="361705" cy="361705"/>
+          </a:xfrm>
+          <a:prstGeom prst="rect">
+            <a:avLst/>
+          </a:prstGeom>
+        </p:spPr>
+      </p:pic>
+      <p:pic>
+        <p:nvPicPr>
+          <p:cNvPr id="79" name="Graphic 78" descr="Gauge with solid fill">
+            <a:extLst>
+              <a:ext uri="{FF2B5EF4-FFF2-40B4-BE49-F238E27FC236}">
+                <a16:creationId xmlns:a16="http://schemas.microsoft.com/office/drawing/2014/main" id="{DDF03687-FF77-475E-9F1D-7E44E09E61D4}"/>
+              </a:ext>
+            </a:extLst>
+          </p:cNvPr>
+          <p:cNvPicPr>
+            <a:picLocks noChangeAspect="1"/>
+          </p:cNvPicPr>
+          <p:nvPr/>
+        </p:nvPicPr>
+        <p:blipFill>
+          <a:blip r:embed="rId16">
+            <a:extLst>
+              <a:ext uri="{28A0092B-C50C-407E-A947-70E740481C1C}">
+                <a14:useLocalDpi xmlns:a14="http://schemas.microsoft.com/office/drawing/2010/main" val="0"/>
+              </a:ext>
+              <a:ext uri="{96DAC541-7B7A-43D3-8B79-37D633B846F1}">
+                <asvg:svgBlip xmlns:asvg="http://schemas.microsoft.com/office/drawing/2016/SVG/main" r:embed="rId17"/>
+              </a:ext>
+            </a:extLst>
+          </a:blip>
+          <a:stretch>
+            <a:fillRect/>
+          </a:stretch>
+        </p:blipFill>
+        <p:spPr>
+          <a:xfrm>
+            <a:off x="1761973" y="3928661"/>
+            <a:ext cx="327660" cy="327660"/>
+          </a:xfrm>
+          <a:prstGeom prst="rect">
+            <a:avLst/>
+          </a:prstGeom>
+        </p:spPr>
+      </p:pic>
+      <p:sp>
+        <p:nvSpPr>
+          <p:cNvPr id="84" name="Speech Bubble: Rectangle 83">
+            <a:extLst>
+              <a:ext uri="{FF2B5EF4-FFF2-40B4-BE49-F238E27FC236}">
+                <a16:creationId xmlns:a16="http://schemas.microsoft.com/office/drawing/2014/main" id="{AFB3E979-C85D-42EC-A4A1-6817A0CB1F5A}"/>
               </a:ext>
             </a:extLst>
           </p:cNvPr>
@@ -17327,13 +17762,13 @@
         </p:nvSpPr>
         <p:spPr>
           <a:xfrm>
-            <a:off x="4112697" y="4604846"/>
-            <a:ext cx="2464637" cy="512791"/>
+            <a:off x="3933213" y="5628639"/>
+            <a:ext cx="1850368" cy="512791"/>
           </a:xfrm>
           <a:prstGeom prst="wedgeRectCallout">
             <a:avLst>
-              <a:gd name="adj1" fmla="val -123798"/>
-              <a:gd name="adj2" fmla="val -229864"/>
+              <a:gd name="adj1" fmla="val -156027"/>
+              <a:gd name="adj2" fmla="val -310107"/>
             </a:avLst>
           </a:prstGeom>
         </p:spPr>
@@ -17360,21 +17795,7 @@
                 <a:effectLst/>
                 <a:latin typeface="Arial" panose="020B0604020202020204" pitchFamily="34" charset="0"/>
               </a:rPr>
-              <a:t>Give</a:t>
-            </a:r>
-            <a:r>
-              <a:rPr lang="es-ES" sz="1800" dirty="0">
-                <a:effectLst/>
-                <a:latin typeface="Arial" panose="020B0604020202020204" pitchFamily="34" charset="0"/>
-              </a:rPr>
-              <a:t> a </a:t>
-            </a:r>
-            <a:r>
-              <a:rPr lang="es-ES" sz="1800" dirty="0" err="1">
-                <a:effectLst/>
-                <a:latin typeface="Arial" panose="020B0604020202020204" pitchFamily="34" charset="0"/>
-              </a:rPr>
-              <a:t>surprise</a:t>
+              <a:t>Speed</a:t>
             </a:r>
             <a:r>
               <a:rPr lang="es-ES" sz="1800" dirty="0">
@@ -17388,7 +17809,14 @@
                 <a:effectLst/>
                 <a:latin typeface="Arial" panose="020B0604020202020204" pitchFamily="34" charset="0"/>
               </a:rPr>
-              <a:t>card</a:t>
+              <a:t>limit</a:t>
+            </a:r>
+            <a:r>
+              <a:rPr lang="es-ES" sz="1800" dirty="0">
+                <a:effectLst/>
+                <a:latin typeface="Arial" panose="020B0604020202020204" pitchFamily="34" charset="0"/>
+              </a:rPr>
+              <a:t> fine</a:t>
             </a:r>
             <a:endParaRPr lang="en-GB" sz="1800" dirty="0">
               <a:effectLst/>
@@ -17399,10 +17827,10 @@
       </p:sp>
       <p:pic>
         <p:nvPicPr>
-          <p:cNvPr id="9" name="Graphic 8" descr="Gauge with solid fill">
-            <a:extLst>
-              <a:ext uri="{FF2B5EF4-FFF2-40B4-BE49-F238E27FC236}">
-                <a16:creationId xmlns:a16="http://schemas.microsoft.com/office/drawing/2014/main" id="{22ADFE0C-05C1-46C7-882E-21DC2E4C80DE}"/>
+          <p:cNvPr id="3" name="Graphic 2" descr="Exclamation mark with solid fill">
+            <a:extLst>
+              <a:ext uri="{FF2B5EF4-FFF2-40B4-BE49-F238E27FC236}">
+                <a16:creationId xmlns:a16="http://schemas.microsoft.com/office/drawing/2014/main" id="{F917F9BA-8AB2-4374-A278-90AFCD94D7DE}"/>
               </a:ext>
             </a:extLst>
           </p:cNvPr>
@@ -17428,8 +17856,8 @@
         </p:blipFill>
         <p:spPr>
           <a:xfrm>
-            <a:off x="1761973" y="2156621"/>
-            <a:ext cx="327660" cy="327660"/>
+            <a:off x="2149579" y="2206943"/>
+            <a:ext cx="263933" cy="263933"/>
           </a:xfrm>
           <a:prstGeom prst="rect">
             <a:avLst/>
@@ -17438,10 +17866,10 @@
       </p:pic>
       <p:pic>
         <p:nvPicPr>
-          <p:cNvPr id="48" name="Graphic 47" descr="Refresh with solid fill">
-            <a:extLst>
-              <a:ext uri="{FF2B5EF4-FFF2-40B4-BE49-F238E27FC236}">
-                <a16:creationId xmlns:a16="http://schemas.microsoft.com/office/drawing/2014/main" id="{EA14456F-07B0-4E57-B373-BCAB8BC2A2C0}"/>
+          <p:cNvPr id="52" name="Graphic 51" descr="Exclamation mark with solid fill">
+            <a:extLst>
+              <a:ext uri="{FF2B5EF4-FFF2-40B4-BE49-F238E27FC236}">
+                <a16:creationId xmlns:a16="http://schemas.microsoft.com/office/drawing/2014/main" id="{83FD484D-F305-41BC-8E77-E3954AD4E4A4}"/>
               </a:ext>
             </a:extLst>
           </p:cNvPr>
@@ -17451,13 +17879,13 @@
           <p:nvPr/>
         </p:nvPicPr>
         <p:blipFill>
-          <a:blip r:embed="rId12">
+          <a:blip r:embed="rId18">
             <a:extLst>
               <a:ext uri="{28A0092B-C50C-407E-A947-70E740481C1C}">
                 <a14:useLocalDpi xmlns:a14="http://schemas.microsoft.com/office/drawing/2010/main" val="0"/>
               </a:ext>
               <a:ext uri="{96DAC541-7B7A-43D3-8B79-37D633B846F1}">
-                <asvg:svgBlip xmlns:asvg="http://schemas.microsoft.com/office/drawing/2016/SVG/main" r:embed="rId13"/>
+                <asvg:svgBlip xmlns:asvg="http://schemas.microsoft.com/office/drawing/2016/SVG/main" r:embed="rId19"/>
               </a:ext>
             </a:extLst>
           </a:blip>
@@ -17467,8 +17895,8 @@
         </p:blipFill>
         <p:spPr>
           <a:xfrm>
-            <a:off x="2794217" y="2732926"/>
-            <a:ext cx="339485" cy="339485"/>
+            <a:off x="2149579" y="2765233"/>
+            <a:ext cx="263933" cy="263933"/>
           </a:xfrm>
           <a:prstGeom prst="rect">
             <a:avLst/>
@@ -17477,10 +17905,10 @@
       </p:pic>
       <p:pic>
         <p:nvPicPr>
-          <p:cNvPr id="49" name="Graphic 48" descr="Treasure chest with solid fill">
-            <a:extLst>
-              <a:ext uri="{FF2B5EF4-FFF2-40B4-BE49-F238E27FC236}">
-                <a16:creationId xmlns:a16="http://schemas.microsoft.com/office/drawing/2014/main" id="{238BAF12-5E39-4C56-B155-6DAFBD9BADFD}"/>
+          <p:cNvPr id="53" name="Graphic 52" descr="Exclamation mark with solid fill">
+            <a:extLst>
+              <a:ext uri="{FF2B5EF4-FFF2-40B4-BE49-F238E27FC236}">
+                <a16:creationId xmlns:a16="http://schemas.microsoft.com/office/drawing/2014/main" id="{4BAB07B0-3E51-4F64-AD4A-AF2AF8D4BE37}"/>
               </a:ext>
             </a:extLst>
           </p:cNvPr>
@@ -17490,13 +17918,13 @@
           <p:nvPr/>
         </p:nvPicPr>
         <p:blipFill>
-          <a:blip r:embed="rId14">
+          <a:blip r:embed="rId18">
             <a:extLst>
               <a:ext uri="{28A0092B-C50C-407E-A947-70E740481C1C}">
                 <a14:useLocalDpi xmlns:a14="http://schemas.microsoft.com/office/drawing/2010/main" val="0"/>
               </a:ext>
               <a:ext uri="{96DAC541-7B7A-43D3-8B79-37D633B846F1}">
-                <asvg:svgBlip xmlns:asvg="http://schemas.microsoft.com/office/drawing/2016/SVG/main" r:embed="rId15"/>
+                <asvg:svgBlip xmlns:asvg="http://schemas.microsoft.com/office/drawing/2016/SVG/main" r:embed="rId19"/>
               </a:ext>
             </a:extLst>
           </a:blip>
@@ -17506,8 +17934,8 @@
         </p:blipFill>
         <p:spPr>
           <a:xfrm>
-            <a:off x="2437720" y="2732926"/>
-            <a:ext cx="361705" cy="361705"/>
+            <a:off x="2301979" y="2917633"/>
+            <a:ext cx="263933" cy="263933"/>
           </a:xfrm>
           <a:prstGeom prst="rect">
             <a:avLst/>
@@ -17516,10 +17944,10 @@
       </p:pic>
       <p:pic>
         <p:nvPicPr>
-          <p:cNvPr id="50" name="Graphic 49" descr="Scroll with solid fill">
-            <a:extLst>
-              <a:ext uri="{FF2B5EF4-FFF2-40B4-BE49-F238E27FC236}">
-                <a16:creationId xmlns:a16="http://schemas.microsoft.com/office/drawing/2014/main" id="{E5072AE3-AFB1-4E85-994E-E44E8C568E33}"/>
+          <p:cNvPr id="54" name="Graphic 53" descr="Exclamation mark with solid fill">
+            <a:extLst>
+              <a:ext uri="{FF2B5EF4-FFF2-40B4-BE49-F238E27FC236}">
+                <a16:creationId xmlns:a16="http://schemas.microsoft.com/office/drawing/2014/main" id="{06070835-2FC0-442E-868D-42CED11E5006}"/>
               </a:ext>
             </a:extLst>
           </p:cNvPr>
@@ -17529,13 +17957,13 @@
           <p:nvPr/>
         </p:nvPicPr>
         <p:blipFill>
-          <a:blip r:embed="rId16">
+          <a:blip r:embed="rId18">
             <a:extLst>
               <a:ext uri="{28A0092B-C50C-407E-A947-70E740481C1C}">
                 <a14:useLocalDpi xmlns:a14="http://schemas.microsoft.com/office/drawing/2010/main" val="0"/>
               </a:ext>
               <a:ext uri="{96DAC541-7B7A-43D3-8B79-37D633B846F1}">
-                <asvg:svgBlip xmlns:asvg="http://schemas.microsoft.com/office/drawing/2016/SVG/main" r:embed="rId17"/>
+                <asvg:svgBlip xmlns:asvg="http://schemas.microsoft.com/office/drawing/2016/SVG/main" r:embed="rId19"/>
               </a:ext>
             </a:extLst>
           </a:blip>
@@ -17545,8 +17973,8 @@
         </p:blipFill>
         <p:spPr>
           <a:xfrm>
-            <a:off x="2089633" y="2739870"/>
-            <a:ext cx="339677" cy="339677"/>
+            <a:off x="2144609" y="3377254"/>
+            <a:ext cx="263933" cy="263933"/>
           </a:xfrm>
           <a:prstGeom prst="rect">
             <a:avLst/>
@@ -17555,10 +17983,10 @@
       </p:pic>
       <p:pic>
         <p:nvPicPr>
-          <p:cNvPr id="51" name="Graphic 50" descr="Gauge with solid fill">
-            <a:extLst>
-              <a:ext uri="{FF2B5EF4-FFF2-40B4-BE49-F238E27FC236}">
-                <a16:creationId xmlns:a16="http://schemas.microsoft.com/office/drawing/2014/main" id="{415139BB-C896-455B-89E4-2D9F28C98026}"/>
+          <p:cNvPr id="55" name="Graphic 54" descr="Exclamation mark with solid fill">
+            <a:extLst>
+              <a:ext uri="{FF2B5EF4-FFF2-40B4-BE49-F238E27FC236}">
+                <a16:creationId xmlns:a16="http://schemas.microsoft.com/office/drawing/2014/main" id="{2195B3C2-F2C4-4129-813C-95F5E93E3490}"/>
               </a:ext>
             </a:extLst>
           </p:cNvPr>
@@ -17584,403 +18012,14 @@
         </p:blipFill>
         <p:spPr>
           <a:xfrm>
-            <a:off x="1761973" y="2719953"/>
-            <a:ext cx="327660" cy="327660"/>
+            <a:off x="2144609" y="3992388"/>
+            <a:ext cx="263933" cy="263933"/>
           </a:xfrm>
           <a:prstGeom prst="rect">
             <a:avLst/>
           </a:prstGeom>
         </p:spPr>
       </p:pic>
-      <p:pic>
-        <p:nvPicPr>
-          <p:cNvPr id="72" name="Graphic 71" descr="Refresh with solid fill">
-            <a:extLst>
-              <a:ext uri="{FF2B5EF4-FFF2-40B4-BE49-F238E27FC236}">
-                <a16:creationId xmlns:a16="http://schemas.microsoft.com/office/drawing/2014/main" id="{8F501946-7D1D-44DA-A23A-D01251BE3AF0}"/>
-              </a:ext>
-            </a:extLst>
-          </p:cNvPr>
-          <p:cNvPicPr>
-            <a:picLocks noChangeAspect="1"/>
-          </p:cNvPicPr>
-          <p:nvPr/>
-        </p:nvPicPr>
-        <p:blipFill>
-          <a:blip r:embed="rId12">
-            <a:extLst>
-              <a:ext uri="{28A0092B-C50C-407E-A947-70E740481C1C}">
-                <a14:useLocalDpi xmlns:a14="http://schemas.microsoft.com/office/drawing/2010/main" val="0"/>
-              </a:ext>
-              <a:ext uri="{96DAC541-7B7A-43D3-8B79-37D633B846F1}">
-                <asvg:svgBlip xmlns:asvg="http://schemas.microsoft.com/office/drawing/2016/SVG/main" r:embed="rId13"/>
-              </a:ext>
-            </a:extLst>
-          </a:blip>
-          <a:stretch>
-            <a:fillRect/>
-          </a:stretch>
-        </p:blipFill>
-        <p:spPr>
-          <a:xfrm>
-            <a:off x="2772657" y="3343807"/>
-            <a:ext cx="339485" cy="339485"/>
-          </a:xfrm>
-          <a:prstGeom prst="rect">
-            <a:avLst/>
-          </a:prstGeom>
-        </p:spPr>
-      </p:pic>
-      <p:pic>
-        <p:nvPicPr>
-          <p:cNvPr id="73" name="Graphic 72" descr="Treasure chest with solid fill">
-            <a:extLst>
-              <a:ext uri="{FF2B5EF4-FFF2-40B4-BE49-F238E27FC236}">
-                <a16:creationId xmlns:a16="http://schemas.microsoft.com/office/drawing/2014/main" id="{2C0774EE-FA08-40A6-A5D1-3F16DD79AB24}"/>
-              </a:ext>
-            </a:extLst>
-          </p:cNvPr>
-          <p:cNvPicPr>
-            <a:picLocks noChangeAspect="1"/>
-          </p:cNvPicPr>
-          <p:nvPr/>
-        </p:nvPicPr>
-        <p:blipFill>
-          <a:blip r:embed="rId14">
-            <a:extLst>
-              <a:ext uri="{28A0092B-C50C-407E-A947-70E740481C1C}">
-                <a14:useLocalDpi xmlns:a14="http://schemas.microsoft.com/office/drawing/2010/main" val="0"/>
-              </a:ext>
-              <a:ext uri="{96DAC541-7B7A-43D3-8B79-37D633B846F1}">
-                <asvg:svgBlip xmlns:asvg="http://schemas.microsoft.com/office/drawing/2016/SVG/main" r:embed="rId15"/>
-              </a:ext>
-            </a:extLst>
-          </a:blip>
-          <a:stretch>
-            <a:fillRect/>
-          </a:stretch>
-        </p:blipFill>
-        <p:spPr>
-          <a:xfrm>
-            <a:off x="2416160" y="3343807"/>
-            <a:ext cx="361705" cy="361705"/>
-          </a:xfrm>
-          <a:prstGeom prst="rect">
-            <a:avLst/>
-          </a:prstGeom>
-        </p:spPr>
-      </p:pic>
-      <p:pic>
-        <p:nvPicPr>
-          <p:cNvPr id="74" name="Graphic 73" descr="Scroll with solid fill">
-            <a:extLst>
-              <a:ext uri="{FF2B5EF4-FFF2-40B4-BE49-F238E27FC236}">
-                <a16:creationId xmlns:a16="http://schemas.microsoft.com/office/drawing/2014/main" id="{2360446A-025E-4E81-BBFD-25401EFA40A9}"/>
-              </a:ext>
-            </a:extLst>
-          </p:cNvPr>
-          <p:cNvPicPr>
-            <a:picLocks noChangeAspect="1"/>
-          </p:cNvPicPr>
-          <p:nvPr/>
-        </p:nvPicPr>
-        <p:blipFill>
-          <a:blip r:embed="rId16">
-            <a:extLst>
-              <a:ext uri="{28A0092B-C50C-407E-A947-70E740481C1C}">
-                <a14:useLocalDpi xmlns:a14="http://schemas.microsoft.com/office/drawing/2010/main" val="0"/>
-              </a:ext>
-              <a:ext uri="{96DAC541-7B7A-43D3-8B79-37D633B846F1}">
-                <asvg:svgBlip xmlns:asvg="http://schemas.microsoft.com/office/drawing/2016/SVG/main" r:embed="rId17"/>
-              </a:ext>
-            </a:extLst>
-          </a:blip>
-          <a:stretch>
-            <a:fillRect/>
-          </a:stretch>
-        </p:blipFill>
-        <p:spPr>
-          <a:xfrm>
-            <a:off x="2068073" y="3350751"/>
-            <a:ext cx="339677" cy="339677"/>
-          </a:xfrm>
-          <a:prstGeom prst="rect">
-            <a:avLst/>
-          </a:prstGeom>
-        </p:spPr>
-      </p:pic>
-      <p:pic>
-        <p:nvPicPr>
-          <p:cNvPr id="75" name="Graphic 74" descr="Gauge with solid fill">
-            <a:extLst>
-              <a:ext uri="{FF2B5EF4-FFF2-40B4-BE49-F238E27FC236}">
-                <a16:creationId xmlns:a16="http://schemas.microsoft.com/office/drawing/2014/main" id="{EED2A392-243C-4827-860D-BDA0EEBE7BC4}"/>
-              </a:ext>
-            </a:extLst>
-          </p:cNvPr>
-          <p:cNvPicPr>
-            <a:picLocks noChangeAspect="1"/>
-          </p:cNvPicPr>
-          <p:nvPr/>
-        </p:nvPicPr>
-        <p:blipFill>
-          <a:blip r:embed="rId18">
-            <a:extLst>
-              <a:ext uri="{28A0092B-C50C-407E-A947-70E740481C1C}">
-                <a14:useLocalDpi xmlns:a14="http://schemas.microsoft.com/office/drawing/2010/main" val="0"/>
-              </a:ext>
-              <a:ext uri="{96DAC541-7B7A-43D3-8B79-37D633B846F1}">
-                <asvg:svgBlip xmlns:asvg="http://schemas.microsoft.com/office/drawing/2016/SVG/main" r:embed="rId19"/>
-              </a:ext>
-            </a:extLst>
-          </a:blip>
-          <a:stretch>
-            <a:fillRect/>
-          </a:stretch>
-        </p:blipFill>
-        <p:spPr>
-          <a:xfrm>
-            <a:off x="1740413" y="3330834"/>
-            <a:ext cx="327660" cy="327660"/>
-          </a:xfrm>
-          <a:prstGeom prst="rect">
-            <a:avLst/>
-          </a:prstGeom>
-        </p:spPr>
-      </p:pic>
-      <p:pic>
-        <p:nvPicPr>
-          <p:cNvPr id="76" name="Graphic 75" descr="Refresh with solid fill">
-            <a:extLst>
-              <a:ext uri="{FF2B5EF4-FFF2-40B4-BE49-F238E27FC236}">
-                <a16:creationId xmlns:a16="http://schemas.microsoft.com/office/drawing/2014/main" id="{8AED5C0F-B48E-4CBD-AD0B-E55681C47BC8}"/>
-              </a:ext>
-            </a:extLst>
-          </p:cNvPr>
-          <p:cNvPicPr>
-            <a:picLocks noChangeAspect="1"/>
-          </p:cNvPicPr>
-          <p:nvPr/>
-        </p:nvPicPr>
-        <p:blipFill>
-          <a:blip r:embed="rId12">
-            <a:extLst>
-              <a:ext uri="{28A0092B-C50C-407E-A947-70E740481C1C}">
-                <a14:useLocalDpi xmlns:a14="http://schemas.microsoft.com/office/drawing/2010/main" val="0"/>
-              </a:ext>
-              <a:ext uri="{96DAC541-7B7A-43D3-8B79-37D633B846F1}">
-                <asvg:svgBlip xmlns:asvg="http://schemas.microsoft.com/office/drawing/2016/SVG/main" r:embed="rId13"/>
-              </a:ext>
-            </a:extLst>
-          </a:blip>
-          <a:stretch>
-            <a:fillRect/>
-          </a:stretch>
-        </p:blipFill>
-        <p:spPr>
-          <a:xfrm>
-            <a:off x="2794217" y="3941634"/>
-            <a:ext cx="339485" cy="339485"/>
-          </a:xfrm>
-          <a:prstGeom prst="rect">
-            <a:avLst/>
-          </a:prstGeom>
-        </p:spPr>
-      </p:pic>
-      <p:pic>
-        <p:nvPicPr>
-          <p:cNvPr id="77" name="Graphic 76" descr="Treasure chest with solid fill">
-            <a:extLst>
-              <a:ext uri="{FF2B5EF4-FFF2-40B4-BE49-F238E27FC236}">
-                <a16:creationId xmlns:a16="http://schemas.microsoft.com/office/drawing/2014/main" id="{474A58A9-4E6E-4F5A-8547-7D626EEF0CDB}"/>
-              </a:ext>
-            </a:extLst>
-          </p:cNvPr>
-          <p:cNvPicPr>
-            <a:picLocks noChangeAspect="1"/>
-          </p:cNvPicPr>
-          <p:nvPr/>
-        </p:nvPicPr>
-        <p:blipFill>
-          <a:blip r:embed="rId14">
-            <a:extLst>
-              <a:ext uri="{28A0092B-C50C-407E-A947-70E740481C1C}">
-                <a14:useLocalDpi xmlns:a14="http://schemas.microsoft.com/office/drawing/2010/main" val="0"/>
-              </a:ext>
-              <a:ext uri="{96DAC541-7B7A-43D3-8B79-37D633B846F1}">
-                <asvg:svgBlip xmlns:asvg="http://schemas.microsoft.com/office/drawing/2016/SVG/main" r:embed="rId15"/>
-              </a:ext>
-            </a:extLst>
-          </a:blip>
-          <a:stretch>
-            <a:fillRect/>
-          </a:stretch>
-        </p:blipFill>
-        <p:spPr>
-          <a:xfrm>
-            <a:off x="2437720" y="3941634"/>
-            <a:ext cx="361705" cy="361705"/>
-          </a:xfrm>
-          <a:prstGeom prst="rect">
-            <a:avLst/>
-          </a:prstGeom>
-        </p:spPr>
-      </p:pic>
-      <p:pic>
-        <p:nvPicPr>
-          <p:cNvPr id="78" name="Graphic 77" descr="Scroll with solid fill">
-            <a:extLst>
-              <a:ext uri="{FF2B5EF4-FFF2-40B4-BE49-F238E27FC236}">
-                <a16:creationId xmlns:a16="http://schemas.microsoft.com/office/drawing/2014/main" id="{6655F2B9-B3B4-4DD9-917A-D3D07D4EE426}"/>
-              </a:ext>
-            </a:extLst>
-          </p:cNvPr>
-          <p:cNvPicPr>
-            <a:picLocks noChangeAspect="1"/>
-          </p:cNvPicPr>
-          <p:nvPr/>
-        </p:nvPicPr>
-        <p:blipFill>
-          <a:blip r:embed="rId16">
-            <a:extLst>
-              <a:ext uri="{28A0092B-C50C-407E-A947-70E740481C1C}">
-                <a14:useLocalDpi xmlns:a14="http://schemas.microsoft.com/office/drawing/2010/main" val="0"/>
-              </a:ext>
-              <a:ext uri="{96DAC541-7B7A-43D3-8B79-37D633B846F1}">
-                <asvg:svgBlip xmlns:asvg="http://schemas.microsoft.com/office/drawing/2016/SVG/main" r:embed="rId17"/>
-              </a:ext>
-            </a:extLst>
-          </a:blip>
-          <a:stretch>
-            <a:fillRect/>
-          </a:stretch>
-        </p:blipFill>
-        <p:spPr>
-          <a:xfrm>
-            <a:off x="2089633" y="3948578"/>
-            <a:ext cx="339677" cy="339677"/>
-          </a:xfrm>
-          <a:prstGeom prst="rect">
-            <a:avLst/>
-          </a:prstGeom>
-        </p:spPr>
-      </p:pic>
-      <p:pic>
-        <p:nvPicPr>
-          <p:cNvPr id="79" name="Graphic 78" descr="Gauge with solid fill">
-            <a:extLst>
-              <a:ext uri="{FF2B5EF4-FFF2-40B4-BE49-F238E27FC236}">
-                <a16:creationId xmlns:a16="http://schemas.microsoft.com/office/drawing/2014/main" id="{DDF03687-FF77-475E-9F1D-7E44E09E61D4}"/>
-              </a:ext>
-            </a:extLst>
-          </p:cNvPr>
-          <p:cNvPicPr>
-            <a:picLocks noChangeAspect="1"/>
-          </p:cNvPicPr>
-          <p:nvPr/>
-        </p:nvPicPr>
-        <p:blipFill>
-          <a:blip r:embed="rId18">
-            <a:extLst>
-              <a:ext uri="{28A0092B-C50C-407E-A947-70E740481C1C}">
-                <a14:useLocalDpi xmlns:a14="http://schemas.microsoft.com/office/drawing/2010/main" val="0"/>
-              </a:ext>
-              <a:ext uri="{96DAC541-7B7A-43D3-8B79-37D633B846F1}">
-                <asvg:svgBlip xmlns:asvg="http://schemas.microsoft.com/office/drawing/2016/SVG/main" r:embed="rId19"/>
-              </a:ext>
-            </a:extLst>
-          </a:blip>
-          <a:stretch>
-            <a:fillRect/>
-          </a:stretch>
-        </p:blipFill>
-        <p:spPr>
-          <a:xfrm>
-            <a:off x="1761973" y="3928661"/>
-            <a:ext cx="327660" cy="327660"/>
-          </a:xfrm>
-          <a:prstGeom prst="rect">
-            <a:avLst/>
-          </a:prstGeom>
-        </p:spPr>
-      </p:pic>
-      <p:sp>
-        <p:nvSpPr>
-          <p:cNvPr id="84" name="Speech Bubble: Rectangle 83">
-            <a:extLst>
-              <a:ext uri="{FF2B5EF4-FFF2-40B4-BE49-F238E27FC236}">
-                <a16:creationId xmlns:a16="http://schemas.microsoft.com/office/drawing/2014/main" id="{AFB3E979-C85D-42EC-A4A1-6817A0CB1F5A}"/>
-              </a:ext>
-            </a:extLst>
-          </p:cNvPr>
-          <p:cNvSpPr/>
-          <p:nvPr/>
-        </p:nvSpPr>
-        <p:spPr>
-          <a:xfrm>
-            <a:off x="3933213" y="5628639"/>
-            <a:ext cx="1850368" cy="512791"/>
-          </a:xfrm>
-          <a:prstGeom prst="wedgeRectCallout">
-            <a:avLst>
-              <a:gd name="adj1" fmla="val -156027"/>
-              <a:gd name="adj2" fmla="val -310107"/>
-            </a:avLst>
-          </a:prstGeom>
-        </p:spPr>
-        <p:style>
-          <a:lnRef idx="2">
-            <a:schemeClr val="dk1"/>
-          </a:lnRef>
-          <a:fillRef idx="1">
-            <a:schemeClr val="lt1"/>
-          </a:fillRef>
-          <a:effectRef idx="0">
-            <a:schemeClr val="dk1"/>
-          </a:effectRef>
-          <a:fontRef idx="minor">
-            <a:schemeClr val="dk1"/>
-          </a:fontRef>
-        </p:style>
-        <p:txBody>
-          <a:bodyPr rtlCol="0" anchor="ctr"/>
-          <a:lstStyle/>
-          <a:p>
-            <a:r>
-              <a:rPr lang="es-ES" sz="1800" dirty="0" err="1">
-                <a:effectLst/>
-                <a:latin typeface="Arial" panose="020B0604020202020204" pitchFamily="34" charset="0"/>
-              </a:rPr>
-              <a:t>Speed</a:t>
-            </a:r>
-            <a:r>
-              <a:rPr lang="es-ES" sz="1800" dirty="0">
-                <a:effectLst/>
-                <a:latin typeface="Arial" panose="020B0604020202020204" pitchFamily="34" charset="0"/>
-              </a:rPr>
-              <a:t> </a:t>
-            </a:r>
-            <a:r>
-              <a:rPr lang="es-ES" sz="1800" dirty="0" err="1">
-                <a:effectLst/>
-                <a:latin typeface="Arial" panose="020B0604020202020204" pitchFamily="34" charset="0"/>
-              </a:rPr>
-              <a:t>limit</a:t>
-            </a:r>
-            <a:r>
-              <a:rPr lang="es-ES" sz="1800" dirty="0">
-                <a:effectLst/>
-                <a:latin typeface="Arial" panose="020B0604020202020204" pitchFamily="34" charset="0"/>
-              </a:rPr>
-              <a:t> fine</a:t>
-            </a:r>
-            <a:endParaRPr lang="en-GB" sz="1800" dirty="0">
-              <a:effectLst/>
-              <a:latin typeface="Arial" panose="020B0604020202020204" pitchFamily="34" charset="0"/>
-            </a:endParaRPr>
-          </a:p>
-        </p:txBody>
-      </p:sp>
     </p:spTree>
     <p:extLst>
       <p:ext uri="{BB962C8B-B14F-4D97-AF65-F5344CB8AC3E}">

</xml_diff>